<commit_message>
grammar fix for slides
</commit_message>
<xml_diff>
--- a/0715.pptx
+++ b/0715.pptx
@@ -112,6 +112,11 @@
       </a:defRPr>
     </a:lvl9pPr>
   </p:defaultTextStyle>
+  <p:extLst>
+    <p:ext uri="{EFAFB233-063F-42B5-8137-9DF3F51BA10A}">
+      <p15:sldGuideLst xmlns:p15="http://schemas.microsoft.com/office/powerpoint/2012/main"/>
+    </p:ext>
+  </p:extLst>
 </p:presentation>
 </file>
 
@@ -4366,13 +4371,16 @@
         </p:nvSpPr>
         <p:spPr/>
         <p:txBody>
-          <a:bodyPr/>
-          <a:lstStyle/>
-          <a:p>
-            <a:r>
-              <a:rPr lang="en-US" dirty="0"/>
-              <a:t>All important features are from motion</a:t>
-            </a:r>
+          <a:bodyPr>
+            <a:normAutofit/>
+          </a:bodyPr>
+          <a:lstStyle/>
+          <a:p>
+            <a:r>
+              <a:rPr lang="en-GB" sz="3200" dirty="0"/>
+              <a:t>All highly important features are derived from motion data</a:t>
+            </a:r>
+            <a:endParaRPr lang="en-US" sz="3200" dirty="0"/>
           </a:p>
         </p:txBody>
       </p:sp>
@@ -4516,11 +4524,15 @@
           <a:lstStyle/>
           <a:p>
             <a:r>
-              <a:rPr lang="en-US" dirty="0"/>
-              <a:t>EMG shows the 3 muscles (masseter, temporalis, mylohyoid) are related to mastication and swallowing. But EMG might not be the most useful way to evaluate the movements, compared with the motion data.</a:t>
-            </a:r>
-          </a:p>
-          <a:p>
+              <a:rPr lang="en-GB" dirty="0"/>
+              <a:t>EMG analysis indicates that the three muscles (masseter, temporalis, mylohyoid) are related to mastication and swallowing.</a:t>
+            </a:r>
+          </a:p>
+          <a:p>
+            <a:r>
+              <a:rPr lang="en-GB" dirty="0"/>
+              <a:t>However, EMG may not be the most effective method for evaluating these movements when compared to motion data.</a:t>
+            </a:r>
             <a:endParaRPr lang="en-US" dirty="0"/>
           </a:p>
         </p:txBody>
@@ -4626,14 +4638,15 @@
           <a:p>
             <a:r>
               <a:rPr lang="en-US" dirty="0"/>
-              <a:t>Do VFSS test?</a:t>
-            </a:r>
-          </a:p>
-          <a:p>
-            <a:r>
-              <a:rPr lang="en-US" dirty="0"/>
-              <a:t>What other ‘kinematics’ should we explore?</a:t>
-            </a:r>
+              <a:t>Perform VFSS test?</a:t>
+            </a:r>
+          </a:p>
+          <a:p>
+            <a:r>
+              <a:rPr lang="en-GB" dirty="0"/>
+              <a:t>What other kinematic parameters should be explored?</a:t>
+            </a:r>
+            <a:endParaRPr lang="en-US" dirty="0"/>
           </a:p>
         </p:txBody>
       </p:sp>

</xml_diff>

<commit_message>
update motion coordinates and slides
</commit_message>
<xml_diff>
--- a/0715.pptx
+++ b/0715.pptx
@@ -267,7 +267,7 @@
           <a:p>
             <a:fld id="{87316932-EEE6-421D-AFB9-BA05C902EF78}" type="datetimeFigureOut">
               <a:rPr lang="en-US" smtClean="0"/>
-              <a:t>7/15/2025</a:t>
+              <a:t>7/18/25</a:t>
             </a:fld>
             <a:endParaRPr lang="en-US"/>
           </a:p>
@@ -465,7 +465,7 @@
           <a:p>
             <a:fld id="{87316932-EEE6-421D-AFB9-BA05C902EF78}" type="datetimeFigureOut">
               <a:rPr lang="en-US" smtClean="0"/>
-              <a:t>7/15/2025</a:t>
+              <a:t>7/18/25</a:t>
             </a:fld>
             <a:endParaRPr lang="en-US"/>
           </a:p>
@@ -673,7 +673,7 @@
           <a:p>
             <a:fld id="{87316932-EEE6-421D-AFB9-BA05C902EF78}" type="datetimeFigureOut">
               <a:rPr lang="en-US" smtClean="0"/>
-              <a:t>7/15/2025</a:t>
+              <a:t>7/18/25</a:t>
             </a:fld>
             <a:endParaRPr lang="en-US"/>
           </a:p>
@@ -871,7 +871,7 @@
           <a:p>
             <a:fld id="{87316932-EEE6-421D-AFB9-BA05C902EF78}" type="datetimeFigureOut">
               <a:rPr lang="en-US" smtClean="0"/>
-              <a:t>7/15/2025</a:t>
+              <a:t>7/18/25</a:t>
             </a:fld>
             <a:endParaRPr lang="en-US"/>
           </a:p>
@@ -1146,7 +1146,7 @@
           <a:p>
             <a:fld id="{87316932-EEE6-421D-AFB9-BA05C902EF78}" type="datetimeFigureOut">
               <a:rPr lang="en-US" smtClean="0"/>
-              <a:t>7/15/2025</a:t>
+              <a:t>7/18/25</a:t>
             </a:fld>
             <a:endParaRPr lang="en-US"/>
           </a:p>
@@ -1411,7 +1411,7 @@
           <a:p>
             <a:fld id="{87316932-EEE6-421D-AFB9-BA05C902EF78}" type="datetimeFigureOut">
               <a:rPr lang="en-US" smtClean="0"/>
-              <a:t>7/15/2025</a:t>
+              <a:t>7/18/25</a:t>
             </a:fld>
             <a:endParaRPr lang="en-US"/>
           </a:p>
@@ -1823,7 +1823,7 @@
           <a:p>
             <a:fld id="{87316932-EEE6-421D-AFB9-BA05C902EF78}" type="datetimeFigureOut">
               <a:rPr lang="en-US" smtClean="0"/>
-              <a:t>7/15/2025</a:t>
+              <a:t>7/18/25</a:t>
             </a:fld>
             <a:endParaRPr lang="en-US"/>
           </a:p>
@@ -1964,7 +1964,7 @@
           <a:p>
             <a:fld id="{87316932-EEE6-421D-AFB9-BA05C902EF78}" type="datetimeFigureOut">
               <a:rPr lang="en-US" smtClean="0"/>
-              <a:t>7/15/2025</a:t>
+              <a:t>7/18/25</a:t>
             </a:fld>
             <a:endParaRPr lang="en-US"/>
           </a:p>
@@ -2077,7 +2077,7 @@
           <a:p>
             <a:fld id="{87316932-EEE6-421D-AFB9-BA05C902EF78}" type="datetimeFigureOut">
               <a:rPr lang="en-US" smtClean="0"/>
-              <a:t>7/15/2025</a:t>
+              <a:t>7/18/25</a:t>
             </a:fld>
             <a:endParaRPr lang="en-US"/>
           </a:p>
@@ -2388,7 +2388,7 @@
           <a:p>
             <a:fld id="{87316932-EEE6-421D-AFB9-BA05C902EF78}" type="datetimeFigureOut">
               <a:rPr lang="en-US" smtClean="0"/>
-              <a:t>7/15/2025</a:t>
+              <a:t>7/18/25</a:t>
             </a:fld>
             <a:endParaRPr lang="en-US"/>
           </a:p>
@@ -2676,7 +2676,7 @@
           <a:p>
             <a:fld id="{87316932-EEE6-421D-AFB9-BA05C902EF78}" type="datetimeFigureOut">
               <a:rPr lang="en-US" smtClean="0"/>
-              <a:t>7/15/2025</a:t>
+              <a:t>7/18/25</a:t>
             </a:fld>
             <a:endParaRPr lang="en-US"/>
           </a:p>
@@ -2917,7 +2917,7 @@
           <a:p>
             <a:fld id="{87316932-EEE6-421D-AFB9-BA05C902EF78}" type="datetimeFigureOut">
               <a:rPr lang="en-US" smtClean="0"/>
-              <a:t>7/15/2025</a:t>
+              <a:t>7/18/25</a:t>
             </a:fld>
             <a:endParaRPr lang="en-US"/>
           </a:p>
@@ -3554,10 +3554,10 @@
       </p:cxnSp>
       <p:pic>
         <p:nvPicPr>
-          <p:cNvPr id="33" name="Picture 32">
-            <a:extLst>
-              <a:ext uri="{FF2B5EF4-FFF2-40B4-BE49-F238E27FC236}">
-                <a16:creationId xmlns:a16="http://schemas.microsoft.com/office/drawing/2014/main" id="{AEE85BBC-0A1C-3E63-CD64-8E3E3E6ABBDA}"/>
+          <p:cNvPr id="3" name="Picture 2">
+            <a:extLst>
+              <a:ext uri="{FF2B5EF4-FFF2-40B4-BE49-F238E27FC236}">
+                <a16:creationId xmlns:a16="http://schemas.microsoft.com/office/drawing/2014/main" id="{EBE536A7-3003-714F-0E7D-545E24B28CDA}"/>
               </a:ext>
             </a:extLst>
           </p:cNvPr>
@@ -3574,8 +3574,8 @@
         </p:blipFill>
         <p:spPr>
           <a:xfrm>
-            <a:off x="5419725" y="1454550"/>
-            <a:ext cx="6018326" cy="4297131"/>
+            <a:off x="4650584" y="1163582"/>
+            <a:ext cx="7556985" cy="5492912"/>
           </a:xfrm>
           <a:prstGeom prst="rect">
             <a:avLst/>
@@ -3696,8 +3696,13 @@
             </a:pPr>
             <a:r>
               <a:rPr lang="en-GB" dirty="0"/>
-              <a:t>Std (Standard Deviation</a:t>
-            </a:r>
+              <a:t>Std (</a:t>
+            </a:r>
+            <a:r>
+              <a:rPr lang="en-GB"/>
+              <a:t>Standard Deviation)</a:t>
+            </a:r>
+            <a:endParaRPr lang="en-GB" dirty="0"/>
           </a:p>
           <a:p>
             <a:pPr marL="514350" indent="-514350">

</xml_diff>